<commit_message>
replacing figures for ch 2 & 3
</commit_message>
<xml_diff>
--- a/content/ch/17/Triptych.pptx
+++ b/content/ch/17/Triptych.pptx
@@ -8,6 +8,7 @@
     <p:sldId id="256" r:id="rId2"/>
     <p:sldId id="257" r:id="rId3"/>
     <p:sldId id="258" r:id="rId4"/>
+    <p:sldId id="259" r:id="rId5"/>
   </p:sldIdLst>
   <p:sldSz cx="12192000" cy="6858000"/>
   <p:notesSz cx="6858000" cy="9144000"/>
@@ -261,7 +262,7 @@
           <a:p>
             <a:fld id="{B0D446C8-A970-3F4D-ABD7-3EB31CDB4E93}" type="datetimeFigureOut">
               <a:rPr lang="en-US" smtClean="0"/>
-              <a:t>7/18/22</a:t>
+              <a:t>1/4/23</a:t>
             </a:fld>
             <a:endParaRPr lang="en-US"/>
           </a:p>
@@ -459,7 +460,7 @@
           <a:p>
             <a:fld id="{B0D446C8-A970-3F4D-ABD7-3EB31CDB4E93}" type="datetimeFigureOut">
               <a:rPr lang="en-US" smtClean="0"/>
-              <a:t>7/18/22</a:t>
+              <a:t>1/4/23</a:t>
             </a:fld>
             <a:endParaRPr lang="en-US"/>
           </a:p>
@@ -667,7 +668,7 @@
           <a:p>
             <a:fld id="{B0D446C8-A970-3F4D-ABD7-3EB31CDB4E93}" type="datetimeFigureOut">
               <a:rPr lang="en-US" smtClean="0"/>
-              <a:t>7/18/22</a:t>
+              <a:t>1/4/23</a:t>
             </a:fld>
             <a:endParaRPr lang="en-US"/>
           </a:p>
@@ -865,7 +866,7 @@
           <a:p>
             <a:fld id="{B0D446C8-A970-3F4D-ABD7-3EB31CDB4E93}" type="datetimeFigureOut">
               <a:rPr lang="en-US" smtClean="0"/>
-              <a:t>7/18/22</a:t>
+              <a:t>1/4/23</a:t>
             </a:fld>
             <a:endParaRPr lang="en-US"/>
           </a:p>
@@ -1140,7 +1141,7 @@
           <a:p>
             <a:fld id="{B0D446C8-A970-3F4D-ABD7-3EB31CDB4E93}" type="datetimeFigureOut">
               <a:rPr lang="en-US" smtClean="0"/>
-              <a:t>7/18/22</a:t>
+              <a:t>1/4/23</a:t>
             </a:fld>
             <a:endParaRPr lang="en-US"/>
           </a:p>
@@ -1405,7 +1406,7 @@
           <a:p>
             <a:fld id="{B0D446C8-A970-3F4D-ABD7-3EB31CDB4E93}" type="datetimeFigureOut">
               <a:rPr lang="en-US" smtClean="0"/>
-              <a:t>7/18/22</a:t>
+              <a:t>1/4/23</a:t>
             </a:fld>
             <a:endParaRPr lang="en-US"/>
           </a:p>
@@ -1817,7 +1818,7 @@
           <a:p>
             <a:fld id="{B0D446C8-A970-3F4D-ABD7-3EB31CDB4E93}" type="datetimeFigureOut">
               <a:rPr lang="en-US" smtClean="0"/>
-              <a:t>7/18/22</a:t>
+              <a:t>1/4/23</a:t>
             </a:fld>
             <a:endParaRPr lang="en-US"/>
           </a:p>
@@ -1958,7 +1959,7 @@
           <a:p>
             <a:fld id="{B0D446C8-A970-3F4D-ABD7-3EB31CDB4E93}" type="datetimeFigureOut">
               <a:rPr lang="en-US" smtClean="0"/>
-              <a:t>7/18/22</a:t>
+              <a:t>1/4/23</a:t>
             </a:fld>
             <a:endParaRPr lang="en-US"/>
           </a:p>
@@ -2071,7 +2072,7 @@
           <a:p>
             <a:fld id="{B0D446C8-A970-3F4D-ABD7-3EB31CDB4E93}" type="datetimeFigureOut">
               <a:rPr lang="en-US" smtClean="0"/>
-              <a:t>7/18/22</a:t>
+              <a:t>1/4/23</a:t>
             </a:fld>
             <a:endParaRPr lang="en-US"/>
           </a:p>
@@ -2382,7 +2383,7 @@
           <a:p>
             <a:fld id="{B0D446C8-A970-3F4D-ABD7-3EB31CDB4E93}" type="datetimeFigureOut">
               <a:rPr lang="en-US" smtClean="0"/>
-              <a:t>7/18/22</a:t>
+              <a:t>1/4/23</a:t>
             </a:fld>
             <a:endParaRPr lang="en-US"/>
           </a:p>
@@ -2670,7 +2671,7 @@
           <a:p>
             <a:fld id="{B0D446C8-A970-3F4D-ABD7-3EB31CDB4E93}" type="datetimeFigureOut">
               <a:rPr lang="en-US" smtClean="0"/>
-              <a:t>7/18/22</a:t>
+              <a:t>1/4/23</a:t>
             </a:fld>
             <a:endParaRPr lang="en-US"/>
           </a:p>
@@ -2911,7 +2912,7 @@
           <a:p>
             <a:fld id="{B0D446C8-A970-3F4D-ABD7-3EB31CDB4E93}" type="datetimeFigureOut">
               <a:rPr lang="en-US" smtClean="0"/>
-              <a:t>7/18/22</a:t>
+              <a:t>1/4/23</a:t>
             </a:fld>
             <a:endParaRPr lang="en-US"/>
           </a:p>
@@ -8070,8 +8071,8 @@
           </p:txBody>
         </p:sp>
       </p:grpSp>
-      <mc:AlternateContent xmlns:mc="http://schemas.openxmlformats.org/markup-compatibility/2006">
-        <mc:Choice xmlns:a14="http://schemas.microsoft.com/office/drawing/2010/main" Requires="a14">
+      <mc:AlternateContent xmlns:mc="http://schemas.openxmlformats.org/markup-compatibility/2006" xmlns:a14="http://schemas.microsoft.com/office/drawing/2010/main">
+        <mc:Choice Requires="a14">
           <p:sp>
             <p:nvSpPr>
               <p:cNvPr id="2" name="TextBox 1">
@@ -8160,7 +8161,7 @@
             </p:txBody>
           </p:sp>
         </mc:Choice>
-        <mc:Fallback>
+        <mc:Fallback xmlns="">
           <p:sp>
             <p:nvSpPr>
               <p:cNvPr id="2" name="TextBox 1">
@@ -8205,8 +8206,8 @@
           </p:sp>
         </mc:Fallback>
       </mc:AlternateContent>
-      <mc:AlternateContent xmlns:mc="http://schemas.openxmlformats.org/markup-compatibility/2006">
-        <mc:Choice xmlns:a14="http://schemas.microsoft.com/office/drawing/2010/main" Requires="a14">
+      <mc:AlternateContent xmlns:mc="http://schemas.openxmlformats.org/markup-compatibility/2006" xmlns:a14="http://schemas.microsoft.com/office/drawing/2010/main">
+        <mc:Choice Requires="a14">
           <p:sp>
             <p:nvSpPr>
               <p:cNvPr id="73" name="TextBox 72">
@@ -8306,7 +8307,7 @@
             </p:txBody>
           </p:sp>
         </mc:Choice>
-        <mc:Fallback>
+        <mc:Fallback xmlns="">
           <p:sp>
             <p:nvSpPr>
               <p:cNvPr id="73" name="TextBox 72">
@@ -8416,8 +8417,8 @@
           </a:prstGeom>
         </p:spPr>
       </p:pic>
-      <mc:AlternateContent xmlns:mc="http://schemas.openxmlformats.org/markup-compatibility/2006">
-        <mc:Choice xmlns:a14="http://schemas.microsoft.com/office/drawing/2010/main" Requires="a14">
+      <mc:AlternateContent xmlns:mc="http://schemas.openxmlformats.org/markup-compatibility/2006" xmlns:a14="http://schemas.microsoft.com/office/drawing/2010/main">
+        <mc:Choice Requires="a14">
           <p:sp>
             <p:nvSpPr>
               <p:cNvPr id="58" name="TextBox 57">
@@ -8482,7 +8483,7 @@
             </p:txBody>
           </p:sp>
         </mc:Choice>
-        <mc:Fallback>
+        <mc:Fallback xmlns="">
           <p:sp>
             <p:nvSpPr>
               <p:cNvPr id="58" name="TextBox 57">
@@ -8527,8 +8528,8 @@
           </p:sp>
         </mc:Fallback>
       </mc:AlternateContent>
-      <mc:AlternateContent xmlns:mc="http://schemas.openxmlformats.org/markup-compatibility/2006">
-        <mc:Choice xmlns:a14="http://schemas.microsoft.com/office/drawing/2010/main" Requires="a14">
+      <mc:AlternateContent xmlns:mc="http://schemas.openxmlformats.org/markup-compatibility/2006" xmlns:a14="http://schemas.microsoft.com/office/drawing/2010/main">
+        <mc:Choice Requires="a14">
           <p:sp>
             <p:nvSpPr>
               <p:cNvPr id="59" name="TextBox 58">
@@ -8617,7 +8618,7 @@
             </p:txBody>
           </p:sp>
         </mc:Choice>
-        <mc:Fallback>
+        <mc:Fallback xmlns="">
           <p:sp>
             <p:nvSpPr>
               <p:cNvPr id="59" name="TextBox 58">
@@ -8662,8 +8663,8 @@
           </p:sp>
         </mc:Fallback>
       </mc:AlternateContent>
-      <mc:AlternateContent xmlns:mc="http://schemas.openxmlformats.org/markup-compatibility/2006">
-        <mc:Choice xmlns:a14="http://schemas.microsoft.com/office/drawing/2010/main" Requires="a14">
+      <mc:AlternateContent xmlns:mc="http://schemas.openxmlformats.org/markup-compatibility/2006" xmlns:a14="http://schemas.microsoft.com/office/drawing/2010/main">
+        <mc:Choice Requires="a14">
           <p:sp>
             <p:nvSpPr>
               <p:cNvPr id="61" name="TextBox 60">
@@ -8733,7 +8734,7 @@
             </p:txBody>
           </p:sp>
         </mc:Choice>
-        <mc:Fallback>
+        <mc:Fallback xmlns="">
           <p:sp>
             <p:nvSpPr>
               <p:cNvPr id="61" name="TextBox 60">
@@ -8778,8 +8779,8 @@
           </p:sp>
         </mc:Fallback>
       </mc:AlternateContent>
-      <mc:AlternateContent xmlns:mc="http://schemas.openxmlformats.org/markup-compatibility/2006">
-        <mc:Choice xmlns:a14="http://schemas.microsoft.com/office/drawing/2010/main" Requires="a14">
+      <mc:AlternateContent xmlns:mc="http://schemas.openxmlformats.org/markup-compatibility/2006" xmlns:a14="http://schemas.microsoft.com/office/drawing/2010/main">
+        <mc:Choice Requires="a14">
           <p:sp>
             <p:nvSpPr>
               <p:cNvPr id="63" name="TextBox 62">
@@ -8849,7 +8850,7 @@
             </p:txBody>
           </p:sp>
         </mc:Choice>
-        <mc:Fallback>
+        <mc:Fallback xmlns="">
           <p:sp>
             <p:nvSpPr>
               <p:cNvPr id="63" name="TextBox 62">
@@ -8894,8 +8895,8 @@
           </p:sp>
         </mc:Fallback>
       </mc:AlternateContent>
-      <mc:AlternateContent xmlns:mc="http://schemas.openxmlformats.org/markup-compatibility/2006">
-        <mc:Choice xmlns:a14="http://schemas.microsoft.com/office/drawing/2010/main" Requires="a14">
+      <mc:AlternateContent xmlns:mc="http://schemas.openxmlformats.org/markup-compatibility/2006" xmlns:a14="http://schemas.microsoft.com/office/drawing/2010/main">
+        <mc:Choice Requires="a14">
           <p:sp>
             <p:nvSpPr>
               <p:cNvPr id="64" name="TextBox 63">
@@ -9003,7 +9004,7 @@
             </p:txBody>
           </p:sp>
         </mc:Choice>
-        <mc:Fallback>
+        <mc:Fallback xmlns="">
           <p:sp>
             <p:nvSpPr>
               <p:cNvPr id="64" name="TextBox 63">
@@ -9052,6 +9053,871 @@
     <p:extLst>
       <p:ext uri="{BB962C8B-B14F-4D97-AF65-F5344CB8AC3E}">
         <p14:creationId xmlns:p14="http://schemas.microsoft.com/office/powerpoint/2010/main" val="2487234798"/>
+      </p:ext>
+    </p:extLst>
+  </p:cSld>
+  <p:clrMapOvr>
+    <a:masterClrMapping/>
+  </p:clrMapOvr>
+</p:sld>
+</file>
+
+<file path=ppt/slides/slide4.xml><?xml version="1.0" encoding="utf-8"?>
+<p:sld xmlns:a="http://schemas.openxmlformats.org/drawingml/2006/main" xmlns:r="http://schemas.openxmlformats.org/officeDocument/2006/relationships" xmlns:p="http://schemas.openxmlformats.org/presentationml/2006/main">
+  <p:cSld>
+    <p:spTree>
+      <p:nvGrpSpPr>
+        <p:cNvPr id="1" name=""/>
+        <p:cNvGrpSpPr/>
+        <p:nvPr/>
+      </p:nvGrpSpPr>
+      <p:grpSpPr>
+        <a:xfrm>
+          <a:off x="0" y="0"/>
+          <a:ext cx="0" cy="0"/>
+          <a:chOff x="0" y="0"/>
+          <a:chExt cx="0" cy="0"/>
+        </a:xfrm>
+      </p:grpSpPr>
+      <p:grpSp>
+        <p:nvGrpSpPr>
+          <p:cNvPr id="82" name="Group 81">
+            <a:extLst>
+              <a:ext uri="{FF2B5EF4-FFF2-40B4-BE49-F238E27FC236}">
+                <a16:creationId xmlns:a16="http://schemas.microsoft.com/office/drawing/2014/main" id="{BF337861-3BE9-D342-9EC0-7A8436CF0A10}"/>
+              </a:ext>
+            </a:extLst>
+          </p:cNvPr>
+          <p:cNvGrpSpPr/>
+          <p:nvPr/>
+        </p:nvGrpSpPr>
+        <p:grpSpPr>
+          <a:xfrm>
+            <a:off x="333633" y="209452"/>
+            <a:ext cx="5394892" cy="3558862"/>
+            <a:chOff x="333633" y="209452"/>
+            <a:chExt cx="5394892" cy="3558862"/>
+          </a:xfrm>
+        </p:grpSpPr>
+        <p:grpSp>
+          <p:nvGrpSpPr>
+            <p:cNvPr id="76" name="Group 75">
+              <a:extLst>
+                <a:ext uri="{FF2B5EF4-FFF2-40B4-BE49-F238E27FC236}">
+                  <a16:creationId xmlns:a16="http://schemas.microsoft.com/office/drawing/2014/main" id="{3A20ED65-ECC5-B545-980E-A36568AAE715}"/>
+                </a:ext>
+              </a:extLst>
+            </p:cNvPr>
+            <p:cNvGrpSpPr/>
+            <p:nvPr/>
+          </p:nvGrpSpPr>
+          <p:grpSpPr>
+            <a:xfrm>
+              <a:off x="333633" y="209452"/>
+              <a:ext cx="5394892" cy="3558862"/>
+              <a:chOff x="333633" y="209452"/>
+              <a:chExt cx="5394892" cy="3558862"/>
+            </a:xfrm>
+          </p:grpSpPr>
+          <p:grpSp>
+            <p:nvGrpSpPr>
+              <p:cNvPr id="71" name="Group 70">
+                <a:extLst>
+                  <a:ext uri="{FF2B5EF4-FFF2-40B4-BE49-F238E27FC236}">
+                    <a16:creationId xmlns:a16="http://schemas.microsoft.com/office/drawing/2014/main" id="{7A13632D-E284-0048-8CA7-C0B9D8D7FDE1}"/>
+                  </a:ext>
+                </a:extLst>
+              </p:cNvPr>
+              <p:cNvGrpSpPr/>
+              <p:nvPr/>
+            </p:nvGrpSpPr>
+            <p:grpSpPr>
+              <a:xfrm>
+                <a:off x="333633" y="1556952"/>
+                <a:ext cx="5394892" cy="2211362"/>
+                <a:chOff x="510153" y="1614031"/>
+                <a:chExt cx="5394892" cy="2211362"/>
+              </a:xfrm>
+            </p:grpSpPr>
+            <p:pic>
+              <p:nvPicPr>
+                <p:cNvPr id="5" name="Picture 4">
+                  <a:extLst>
+                    <a:ext uri="{FF2B5EF4-FFF2-40B4-BE49-F238E27FC236}">
+                      <a16:creationId xmlns:a16="http://schemas.microsoft.com/office/drawing/2014/main" id="{929F5182-4AE7-AC4B-9D20-6A43EA71D473}"/>
+                    </a:ext>
+                  </a:extLst>
+                </p:cNvPr>
+                <p:cNvPicPr>
+                  <a:picLocks noChangeAspect="1"/>
+                </p:cNvPicPr>
+                <p:nvPr/>
+              </p:nvPicPr>
+              <p:blipFill>
+                <a:blip r:embed="rId2"/>
+                <a:stretch>
+                  <a:fillRect/>
+                </a:stretch>
+              </p:blipFill>
+              <p:spPr>
+                <a:xfrm>
+                  <a:off x="510153" y="1614031"/>
+                  <a:ext cx="3212757" cy="2211362"/>
+                </a:xfrm>
+                <a:prstGeom prst="rect">
+                  <a:avLst/>
+                </a:prstGeom>
+              </p:spPr>
+            </p:pic>
+            <p:sp>
+              <p:nvSpPr>
+                <p:cNvPr id="16" name="Triangle 15">
+                  <a:extLst>
+                    <a:ext uri="{FF2B5EF4-FFF2-40B4-BE49-F238E27FC236}">
+                      <a16:creationId xmlns:a16="http://schemas.microsoft.com/office/drawing/2014/main" id="{0A0B82B3-8746-864E-A146-7FB5CE521A74}"/>
+                    </a:ext>
+                  </a:extLst>
+                </p:cNvPr>
+                <p:cNvSpPr/>
+                <p:nvPr/>
+              </p:nvSpPr>
+              <p:spPr>
+                <a:xfrm rot="10800000">
+                  <a:off x="5543727" y="2357972"/>
+                  <a:ext cx="304546" cy="386499"/>
+                </a:xfrm>
+                <a:prstGeom prst="triangle">
+                  <a:avLst/>
+                </a:prstGeom>
+                <a:solidFill>
+                  <a:schemeClr val="tx1"/>
+                </a:solidFill>
+                <a:ln>
+                  <a:solidFill>
+                    <a:schemeClr val="tx1"/>
+                  </a:solidFill>
+                </a:ln>
+              </p:spPr>
+              <p:style>
+                <a:lnRef idx="2">
+                  <a:schemeClr val="accent1">
+                    <a:shade val="50000"/>
+                  </a:schemeClr>
+                </a:lnRef>
+                <a:fillRef idx="1">
+                  <a:schemeClr val="accent1"/>
+                </a:fillRef>
+                <a:effectRef idx="0">
+                  <a:schemeClr val="accent1"/>
+                </a:effectRef>
+                <a:fontRef idx="minor">
+                  <a:schemeClr val="lt1"/>
+                </a:fontRef>
+              </p:style>
+              <p:txBody>
+                <a:bodyPr rtlCol="0" anchor="ctr"/>
+                <a:lstStyle/>
+                <a:p>
+                  <a:pPr algn="ctr"/>
+                  <a:endParaRPr lang="en-US" dirty="0"/>
+                </a:p>
+              </p:txBody>
+            </p:sp>
+            <p:sp>
+              <p:nvSpPr>
+                <p:cNvPr id="18" name="TextBox 17">
+                  <a:extLst>
+                    <a:ext uri="{FF2B5EF4-FFF2-40B4-BE49-F238E27FC236}">
+                      <a16:creationId xmlns:a16="http://schemas.microsoft.com/office/drawing/2014/main" id="{C668BDED-97AB-1E47-A273-36B27515B521}"/>
+                    </a:ext>
+                  </a:extLst>
+                </p:cNvPr>
+                <p:cNvSpPr txBox="1"/>
+                <p:nvPr/>
+              </p:nvSpPr>
+              <p:spPr>
+                <a:xfrm>
+                  <a:off x="4359557" y="1713809"/>
+                  <a:ext cx="1025952" cy="369332"/>
+                </a:xfrm>
+                <a:prstGeom prst="rect">
+                  <a:avLst/>
+                </a:prstGeom>
+                <a:noFill/>
+              </p:spPr>
+              <p:txBody>
+                <a:bodyPr wrap="square" rtlCol="0">
+                  <a:spAutoFit/>
+                </a:bodyPr>
+                <a:lstStyle/>
+                <a:p>
+                  <a:r>
+                    <a:rPr lang="en-US" b="1" dirty="0"/>
+                    <a:t>Draw #1</a:t>
+                  </a:r>
+                </a:p>
+              </p:txBody>
+            </p:sp>
+            <p:pic>
+              <p:nvPicPr>
+                <p:cNvPr id="24" name="Picture 23">
+                  <a:extLst>
+                    <a:ext uri="{FF2B5EF4-FFF2-40B4-BE49-F238E27FC236}">
+                      <a16:creationId xmlns:a16="http://schemas.microsoft.com/office/drawing/2014/main" id="{B610EB9C-E7F0-704B-B57C-D92F2A8E6002}"/>
+                    </a:ext>
+                  </a:extLst>
+                </p:cNvPr>
+                <p:cNvPicPr>
+                  <a:picLocks noChangeAspect="1"/>
+                </p:cNvPicPr>
+                <p:nvPr/>
+              </p:nvPicPr>
+              <p:blipFill>
+                <a:blip r:embed="rId3"/>
+                <a:stretch>
+                  <a:fillRect/>
+                </a:stretch>
+              </p:blipFill>
+              <p:spPr>
+                <a:xfrm rot="16415862">
+                  <a:off x="1342796" y="3323211"/>
+                  <a:ext cx="377596" cy="377596"/>
+                </a:xfrm>
+                <a:prstGeom prst="rect">
+                  <a:avLst/>
+                </a:prstGeom>
+              </p:spPr>
+            </p:pic>
+            <p:pic>
+              <p:nvPicPr>
+                <p:cNvPr id="32" name="Picture 31">
+                  <a:extLst>
+                    <a:ext uri="{FF2B5EF4-FFF2-40B4-BE49-F238E27FC236}">
+                      <a16:creationId xmlns:a16="http://schemas.microsoft.com/office/drawing/2014/main" id="{647E4B7F-1953-F24B-9946-CD380A5C123F}"/>
+                    </a:ext>
+                  </a:extLst>
+                </p:cNvPr>
+                <p:cNvPicPr>
+                  <a:picLocks noChangeAspect="1"/>
+                </p:cNvPicPr>
+                <p:nvPr/>
+              </p:nvPicPr>
+              <p:blipFill>
+                <a:blip r:embed="rId3"/>
+                <a:stretch>
+                  <a:fillRect/>
+                </a:stretch>
+              </p:blipFill>
+              <p:spPr>
+                <a:xfrm rot="8467023">
+                  <a:off x="2561996" y="3298072"/>
+                  <a:ext cx="377596" cy="377596"/>
+                </a:xfrm>
+                <a:prstGeom prst="rect">
+                  <a:avLst/>
+                </a:prstGeom>
+              </p:spPr>
+            </p:pic>
+            <p:pic>
+              <p:nvPicPr>
+                <p:cNvPr id="33" name="Picture 32">
+                  <a:extLst>
+                    <a:ext uri="{FF2B5EF4-FFF2-40B4-BE49-F238E27FC236}">
+                      <a16:creationId xmlns:a16="http://schemas.microsoft.com/office/drawing/2014/main" id="{71D33E9C-2568-FB44-ADFF-121E3B3174CA}"/>
+                    </a:ext>
+                  </a:extLst>
+                </p:cNvPr>
+                <p:cNvPicPr>
+                  <a:picLocks noChangeAspect="1"/>
+                </p:cNvPicPr>
+                <p:nvPr/>
+              </p:nvPicPr>
+              <p:blipFill>
+                <a:blip r:embed="rId3"/>
+                <a:stretch>
+                  <a:fillRect/>
+                </a:stretch>
+              </p:blipFill>
+              <p:spPr>
+                <a:xfrm>
+                  <a:off x="2922422" y="3056074"/>
+                  <a:ext cx="377596" cy="377596"/>
+                </a:xfrm>
+                <a:prstGeom prst="rect">
+                  <a:avLst/>
+                </a:prstGeom>
+              </p:spPr>
+            </p:pic>
+            <p:pic>
+              <p:nvPicPr>
+                <p:cNvPr id="51" name="Picture 50">
+                  <a:extLst>
+                    <a:ext uri="{FF2B5EF4-FFF2-40B4-BE49-F238E27FC236}">
+                      <a16:creationId xmlns:a16="http://schemas.microsoft.com/office/drawing/2014/main" id="{630567DB-AE3E-6444-A1A4-2DA2AF91B613}"/>
+                    </a:ext>
+                  </a:extLst>
+                </p:cNvPr>
+                <p:cNvPicPr>
+                  <a:picLocks noChangeAspect="1"/>
+                </p:cNvPicPr>
+                <p:nvPr/>
+              </p:nvPicPr>
+              <p:blipFill>
+                <a:blip r:embed="rId3"/>
+                <a:stretch>
+                  <a:fillRect/>
+                </a:stretch>
+              </p:blipFill>
+              <p:spPr>
+                <a:xfrm rot="19067721">
+                  <a:off x="4388927" y="2992888"/>
+                  <a:ext cx="377596" cy="377596"/>
+                </a:xfrm>
+                <a:prstGeom prst="rect">
+                  <a:avLst/>
+                </a:prstGeom>
+              </p:spPr>
+            </p:pic>
+            <p:pic>
+              <p:nvPicPr>
+                <p:cNvPr id="52" name="Picture 51">
+                  <a:extLst>
+                    <a:ext uri="{FF2B5EF4-FFF2-40B4-BE49-F238E27FC236}">
+                      <a16:creationId xmlns:a16="http://schemas.microsoft.com/office/drawing/2014/main" id="{87CF84BD-AB17-974D-AD06-93F764123DE4}"/>
+                    </a:ext>
+                  </a:extLst>
+                </p:cNvPr>
+                <p:cNvPicPr>
+                  <a:picLocks noChangeAspect="1"/>
+                </p:cNvPicPr>
+                <p:nvPr/>
+              </p:nvPicPr>
+              <p:blipFill>
+                <a:blip r:embed="rId3"/>
+                <a:stretch>
+                  <a:fillRect/>
+                </a:stretch>
+              </p:blipFill>
+              <p:spPr>
+                <a:xfrm rot="7129247">
+                  <a:off x="5527449" y="2988092"/>
+                  <a:ext cx="377596" cy="377596"/>
+                </a:xfrm>
+                <a:prstGeom prst="rect">
+                  <a:avLst/>
+                </a:prstGeom>
+              </p:spPr>
+            </p:pic>
+          </p:grpSp>
+          <p:sp>
+            <p:nvSpPr>
+              <p:cNvPr id="64" name="TextBox 63">
+                <a:extLst>
+                  <a:ext uri="{FF2B5EF4-FFF2-40B4-BE49-F238E27FC236}">
+                    <a16:creationId xmlns:a16="http://schemas.microsoft.com/office/drawing/2014/main" id="{1360AC39-0A07-514E-B369-23CB1003BCC5}"/>
+                  </a:ext>
+                </a:extLst>
+              </p:cNvPr>
+              <p:cNvSpPr txBox="1"/>
+              <p:nvPr/>
+            </p:nvSpPr>
+            <p:spPr>
+              <a:xfrm>
+                <a:off x="4607287" y="721736"/>
+                <a:ext cx="1025952" cy="369332"/>
+              </a:xfrm>
+              <a:prstGeom prst="rect">
+                <a:avLst/>
+              </a:prstGeom>
+              <a:noFill/>
+            </p:spPr>
+            <p:txBody>
+              <a:bodyPr wrap="square" rtlCol="0">
+                <a:spAutoFit/>
+              </a:bodyPr>
+              <a:lstStyle/>
+              <a:p>
+                <a:r>
+                  <a:rPr lang="en-US" b="1" dirty="0"/>
+                  <a:t>Draw #2</a:t>
+                </a:r>
+              </a:p>
+            </p:txBody>
+          </p:sp>
+          <p:sp>
+            <p:nvSpPr>
+              <p:cNvPr id="69" name="Freeform 68">
+                <a:extLst>
+                  <a:ext uri="{FF2B5EF4-FFF2-40B4-BE49-F238E27FC236}">
+                    <a16:creationId xmlns:a16="http://schemas.microsoft.com/office/drawing/2014/main" id="{3541497B-09F5-5C41-AA68-97EE250F409D}"/>
+                  </a:ext>
+                </a:extLst>
+              </p:cNvPr>
+              <p:cNvSpPr/>
+              <p:nvPr/>
+            </p:nvSpPr>
+            <p:spPr>
+              <a:xfrm>
+                <a:off x="1606378" y="209452"/>
+                <a:ext cx="2780271" cy="2285581"/>
+              </a:xfrm>
+              <a:custGeom>
+                <a:avLst/>
+                <a:gdLst>
+                  <a:gd name="connsiteX0" fmla="*/ 0 w 3975169"/>
+                  <a:gd name="connsiteY0" fmla="*/ 2175402 h 2285581"/>
+                  <a:gd name="connsiteX1" fmla="*/ 902044 w 3975169"/>
+                  <a:gd name="connsiteY1" fmla="*/ 50040 h 2285581"/>
+                  <a:gd name="connsiteX2" fmla="*/ 3027406 w 3975169"/>
+                  <a:gd name="connsiteY2" fmla="*/ 791445 h 2285581"/>
+                  <a:gd name="connsiteX3" fmla="*/ 3880022 w 3975169"/>
+                  <a:gd name="connsiteY3" fmla="*/ 2150689 h 2285581"/>
+                  <a:gd name="connsiteX4" fmla="*/ 3917092 w 3975169"/>
+                  <a:gd name="connsiteY4" fmla="*/ 2163045 h 2285581"/>
+                </a:gdLst>
+                <a:ahLst/>
+                <a:cxnLst>
+                  <a:cxn ang="0">
+                    <a:pos x="connsiteX0" y="connsiteY0"/>
+                  </a:cxn>
+                  <a:cxn ang="0">
+                    <a:pos x="connsiteX1" y="connsiteY1"/>
+                  </a:cxn>
+                  <a:cxn ang="0">
+                    <a:pos x="connsiteX2" y="connsiteY2"/>
+                  </a:cxn>
+                  <a:cxn ang="0">
+                    <a:pos x="connsiteX3" y="connsiteY3"/>
+                  </a:cxn>
+                  <a:cxn ang="0">
+                    <a:pos x="connsiteX4" y="connsiteY4"/>
+                  </a:cxn>
+                </a:cxnLst>
+                <a:rect l="l" t="t" r="r" b="b"/>
+                <a:pathLst>
+                  <a:path w="3975169" h="2285581">
+                    <a:moveTo>
+                      <a:pt x="0" y="2175402"/>
+                    </a:moveTo>
+                    <a:cubicBezTo>
+                      <a:pt x="198738" y="1228050"/>
+                      <a:pt x="397476" y="280699"/>
+                      <a:pt x="902044" y="50040"/>
+                    </a:cubicBezTo>
+                    <a:cubicBezTo>
+                      <a:pt x="1406612" y="-180619"/>
+                      <a:pt x="2531076" y="441337"/>
+                      <a:pt x="3027406" y="791445"/>
+                    </a:cubicBezTo>
+                    <a:cubicBezTo>
+                      <a:pt x="3523736" y="1141553"/>
+                      <a:pt x="3731741" y="1922089"/>
+                      <a:pt x="3880022" y="2150689"/>
+                    </a:cubicBezTo>
+                    <a:cubicBezTo>
+                      <a:pt x="4028303" y="2379289"/>
+                      <a:pt x="3972697" y="2271167"/>
+                      <a:pt x="3917092" y="2163045"/>
+                    </a:cubicBezTo>
+                  </a:path>
+                </a:pathLst>
+              </a:custGeom>
+              <a:noFill/>
+              <a:ln w="25400">
+                <a:solidFill>
+                  <a:schemeClr val="tx1"/>
+                </a:solidFill>
+              </a:ln>
+            </p:spPr>
+            <p:style>
+              <a:lnRef idx="2">
+                <a:schemeClr val="accent1">
+                  <a:shade val="50000"/>
+                </a:schemeClr>
+              </a:lnRef>
+              <a:fillRef idx="1">
+                <a:schemeClr val="accent1"/>
+              </a:fillRef>
+              <a:effectRef idx="0">
+                <a:schemeClr val="accent1"/>
+              </a:effectRef>
+              <a:fontRef idx="minor">
+                <a:schemeClr val="lt1"/>
+              </a:fontRef>
+            </p:style>
+            <p:txBody>
+              <a:bodyPr rtlCol="0" anchor="ctr"/>
+              <a:lstStyle/>
+              <a:p>
+                <a:pPr algn="ctr"/>
+                <a:endParaRPr lang="en-US"/>
+              </a:p>
+            </p:txBody>
+          </p:sp>
+          <p:sp>
+            <p:nvSpPr>
+              <p:cNvPr id="74" name="Freeform 73">
+                <a:extLst>
+                  <a:ext uri="{FF2B5EF4-FFF2-40B4-BE49-F238E27FC236}">
+                    <a16:creationId xmlns:a16="http://schemas.microsoft.com/office/drawing/2014/main" id="{41C8708E-8EA9-7E45-B334-395CEB011DC7}"/>
+                  </a:ext>
+                </a:extLst>
+              </p:cNvPr>
+              <p:cNvSpPr/>
+              <p:nvPr/>
+            </p:nvSpPr>
+            <p:spPr>
+              <a:xfrm>
+                <a:off x="1606378" y="287712"/>
+                <a:ext cx="3991233" cy="2134212"/>
+              </a:xfrm>
+              <a:custGeom>
+                <a:avLst/>
+                <a:gdLst>
+                  <a:gd name="connsiteX0" fmla="*/ 0 w 3975169"/>
+                  <a:gd name="connsiteY0" fmla="*/ 2175402 h 2285581"/>
+                  <a:gd name="connsiteX1" fmla="*/ 902044 w 3975169"/>
+                  <a:gd name="connsiteY1" fmla="*/ 50040 h 2285581"/>
+                  <a:gd name="connsiteX2" fmla="*/ 3027406 w 3975169"/>
+                  <a:gd name="connsiteY2" fmla="*/ 791445 h 2285581"/>
+                  <a:gd name="connsiteX3" fmla="*/ 3880022 w 3975169"/>
+                  <a:gd name="connsiteY3" fmla="*/ 2150689 h 2285581"/>
+                  <a:gd name="connsiteX4" fmla="*/ 3917092 w 3975169"/>
+                  <a:gd name="connsiteY4" fmla="*/ 2163045 h 2285581"/>
+                </a:gdLst>
+                <a:ahLst/>
+                <a:cxnLst>
+                  <a:cxn ang="0">
+                    <a:pos x="connsiteX0" y="connsiteY0"/>
+                  </a:cxn>
+                  <a:cxn ang="0">
+                    <a:pos x="connsiteX1" y="connsiteY1"/>
+                  </a:cxn>
+                  <a:cxn ang="0">
+                    <a:pos x="connsiteX2" y="connsiteY2"/>
+                  </a:cxn>
+                  <a:cxn ang="0">
+                    <a:pos x="connsiteX3" y="connsiteY3"/>
+                  </a:cxn>
+                  <a:cxn ang="0">
+                    <a:pos x="connsiteX4" y="connsiteY4"/>
+                  </a:cxn>
+                </a:cxnLst>
+                <a:rect l="l" t="t" r="r" b="b"/>
+                <a:pathLst>
+                  <a:path w="3975169" h="2285581">
+                    <a:moveTo>
+                      <a:pt x="0" y="2175402"/>
+                    </a:moveTo>
+                    <a:cubicBezTo>
+                      <a:pt x="198738" y="1228050"/>
+                      <a:pt x="397476" y="280699"/>
+                      <a:pt x="902044" y="50040"/>
+                    </a:cubicBezTo>
+                    <a:cubicBezTo>
+                      <a:pt x="1406612" y="-180619"/>
+                      <a:pt x="2531076" y="441337"/>
+                      <a:pt x="3027406" y="791445"/>
+                    </a:cubicBezTo>
+                    <a:cubicBezTo>
+                      <a:pt x="3523736" y="1141553"/>
+                      <a:pt x="3731741" y="1922089"/>
+                      <a:pt x="3880022" y="2150689"/>
+                    </a:cubicBezTo>
+                    <a:cubicBezTo>
+                      <a:pt x="4028303" y="2379289"/>
+                      <a:pt x="3972697" y="2271167"/>
+                      <a:pt x="3917092" y="2163045"/>
+                    </a:cubicBezTo>
+                  </a:path>
+                </a:pathLst>
+              </a:custGeom>
+              <a:noFill/>
+              <a:ln w="25400">
+                <a:solidFill>
+                  <a:schemeClr val="tx1"/>
+                </a:solidFill>
+              </a:ln>
+            </p:spPr>
+            <p:style>
+              <a:lnRef idx="2">
+                <a:schemeClr val="accent1">
+                  <a:shade val="50000"/>
+                </a:schemeClr>
+              </a:lnRef>
+              <a:fillRef idx="1">
+                <a:schemeClr val="accent1"/>
+              </a:fillRef>
+              <a:effectRef idx="0">
+                <a:schemeClr val="accent1"/>
+              </a:effectRef>
+              <a:fontRef idx="minor">
+                <a:schemeClr val="lt1"/>
+              </a:fontRef>
+            </p:style>
+            <p:txBody>
+              <a:bodyPr rtlCol="0" anchor="ctr"/>
+              <a:lstStyle/>
+              <a:p>
+                <a:pPr algn="ctr"/>
+                <a:endParaRPr lang="en-US" dirty="0"/>
+              </a:p>
+            </p:txBody>
+          </p:sp>
+          <p:sp>
+            <p:nvSpPr>
+              <p:cNvPr id="75" name="Triangle 74">
+                <a:extLst>
+                  <a:ext uri="{FF2B5EF4-FFF2-40B4-BE49-F238E27FC236}">
+                    <a16:creationId xmlns:a16="http://schemas.microsoft.com/office/drawing/2014/main" id="{EEB9E302-FE50-394B-8B16-A9B127BDA849}"/>
+                  </a:ext>
+                </a:extLst>
+              </p:cNvPr>
+              <p:cNvSpPr/>
+              <p:nvPr/>
+            </p:nvSpPr>
+            <p:spPr>
+              <a:xfrm rot="10800000">
+                <a:off x="4234502" y="2354439"/>
+                <a:ext cx="304546" cy="386499"/>
+              </a:xfrm>
+              <a:prstGeom prst="triangle">
+                <a:avLst/>
+              </a:prstGeom>
+              <a:solidFill>
+                <a:schemeClr val="tx1"/>
+              </a:solidFill>
+              <a:ln>
+                <a:solidFill>
+                  <a:schemeClr val="tx1"/>
+                </a:solidFill>
+              </a:ln>
+            </p:spPr>
+            <p:style>
+              <a:lnRef idx="2">
+                <a:schemeClr val="accent1">
+                  <a:shade val="50000"/>
+                </a:schemeClr>
+              </a:lnRef>
+              <a:fillRef idx="1">
+                <a:schemeClr val="accent1"/>
+              </a:fillRef>
+              <a:effectRef idx="0">
+                <a:schemeClr val="accent1"/>
+              </a:effectRef>
+              <a:fontRef idx="minor">
+                <a:schemeClr val="lt1"/>
+              </a:fontRef>
+            </p:style>
+            <p:txBody>
+              <a:bodyPr rtlCol="0" anchor="ctr"/>
+              <a:lstStyle/>
+              <a:p>
+                <a:pPr algn="ctr"/>
+                <a:endParaRPr lang="en-US" dirty="0"/>
+              </a:p>
+            </p:txBody>
+          </p:sp>
+        </p:grpSp>
+        <p:grpSp>
+          <p:nvGrpSpPr>
+            <p:cNvPr id="81" name="Group 80">
+              <a:extLst>
+                <a:ext uri="{FF2B5EF4-FFF2-40B4-BE49-F238E27FC236}">
+                  <a16:creationId xmlns:a16="http://schemas.microsoft.com/office/drawing/2014/main" id="{2600377A-F035-F745-B63F-22A704B9055D}"/>
+                </a:ext>
+              </a:extLst>
+            </p:cNvPr>
+            <p:cNvGrpSpPr/>
+            <p:nvPr/>
+          </p:nvGrpSpPr>
+          <p:grpSpPr>
+            <a:xfrm>
+              <a:off x="1178010" y="2932670"/>
+              <a:ext cx="4534931" cy="716693"/>
+              <a:chOff x="1178010" y="2932670"/>
+              <a:chExt cx="4534931" cy="716693"/>
+            </a:xfrm>
+          </p:grpSpPr>
+          <p:sp>
+            <p:nvSpPr>
+              <p:cNvPr id="77" name="Oval 76">
+                <a:extLst>
+                  <a:ext uri="{FF2B5EF4-FFF2-40B4-BE49-F238E27FC236}">
+                    <a16:creationId xmlns:a16="http://schemas.microsoft.com/office/drawing/2014/main" id="{1B4AA1CD-24BB-A446-A196-68E4E5FD2178}"/>
+                  </a:ext>
+                </a:extLst>
+              </p:cNvPr>
+              <p:cNvSpPr/>
+              <p:nvPr/>
+            </p:nvSpPr>
+            <p:spPr>
+              <a:xfrm>
+                <a:off x="1178010" y="3278660"/>
+                <a:ext cx="358347" cy="370703"/>
+              </a:xfrm>
+              <a:prstGeom prst="ellipse">
+                <a:avLst/>
+              </a:prstGeom>
+              <a:solidFill>
+                <a:schemeClr val="tx1">
+                  <a:alpha val="49000"/>
+                </a:schemeClr>
+              </a:solidFill>
+            </p:spPr>
+            <p:style>
+              <a:lnRef idx="2">
+                <a:schemeClr val="accent1">
+                  <a:shade val="50000"/>
+                </a:schemeClr>
+              </a:lnRef>
+              <a:fillRef idx="1">
+                <a:schemeClr val="accent1"/>
+              </a:fillRef>
+              <a:effectRef idx="0">
+                <a:schemeClr val="accent1"/>
+              </a:effectRef>
+              <a:fontRef idx="minor">
+                <a:schemeClr val="lt1"/>
+              </a:fontRef>
+            </p:style>
+            <p:txBody>
+              <a:bodyPr rtlCol="0" anchor="ctr"/>
+              <a:lstStyle/>
+              <a:p>
+                <a:pPr algn="ctr"/>
+                <a:endParaRPr lang="en-US" dirty="0"/>
+              </a:p>
+              <a:p>
+                <a:pPr algn="ctr"/>
+                <a:endParaRPr lang="en-US" dirty="0"/>
+              </a:p>
+            </p:txBody>
+          </p:sp>
+          <p:sp>
+            <p:nvSpPr>
+              <p:cNvPr id="78" name="Oval 77">
+                <a:extLst>
+                  <a:ext uri="{FF2B5EF4-FFF2-40B4-BE49-F238E27FC236}">
+                    <a16:creationId xmlns:a16="http://schemas.microsoft.com/office/drawing/2014/main" id="{4CE652D0-0ED7-0640-8AE6-542FD819F313}"/>
+                  </a:ext>
+                </a:extLst>
+              </p:cNvPr>
+              <p:cNvSpPr/>
+              <p:nvPr/>
+            </p:nvSpPr>
+            <p:spPr>
+              <a:xfrm>
+                <a:off x="2759676" y="2982097"/>
+                <a:ext cx="358347" cy="370703"/>
+              </a:xfrm>
+              <a:prstGeom prst="ellipse">
+                <a:avLst/>
+              </a:prstGeom>
+              <a:solidFill>
+                <a:schemeClr val="tx1">
+                  <a:alpha val="49000"/>
+                </a:schemeClr>
+              </a:solidFill>
+            </p:spPr>
+            <p:style>
+              <a:lnRef idx="2">
+                <a:schemeClr val="accent1">
+                  <a:shade val="50000"/>
+                </a:schemeClr>
+              </a:lnRef>
+              <a:fillRef idx="1">
+                <a:schemeClr val="accent1"/>
+              </a:fillRef>
+              <a:effectRef idx="0">
+                <a:schemeClr val="accent1"/>
+              </a:effectRef>
+              <a:fontRef idx="minor">
+                <a:schemeClr val="lt1"/>
+              </a:fontRef>
+            </p:style>
+            <p:txBody>
+              <a:bodyPr rtlCol="0" anchor="ctr"/>
+              <a:lstStyle/>
+              <a:p>
+                <a:pPr algn="ctr"/>
+                <a:endParaRPr lang="en-US"/>
+              </a:p>
+            </p:txBody>
+          </p:sp>
+          <p:sp>
+            <p:nvSpPr>
+              <p:cNvPr id="79" name="Oval 78">
+                <a:extLst>
+                  <a:ext uri="{FF2B5EF4-FFF2-40B4-BE49-F238E27FC236}">
+                    <a16:creationId xmlns:a16="http://schemas.microsoft.com/office/drawing/2014/main" id="{B90C1477-3D64-7F4E-9BA1-0DED9CBC8F1C}"/>
+                  </a:ext>
+                </a:extLst>
+              </p:cNvPr>
+              <p:cNvSpPr/>
+              <p:nvPr/>
+            </p:nvSpPr>
+            <p:spPr>
+              <a:xfrm>
+                <a:off x="5354594" y="2932670"/>
+                <a:ext cx="358347" cy="370703"/>
+              </a:xfrm>
+              <a:prstGeom prst="ellipse">
+                <a:avLst/>
+              </a:prstGeom>
+              <a:solidFill>
+                <a:schemeClr val="tx1">
+                  <a:alpha val="49000"/>
+                </a:schemeClr>
+              </a:solidFill>
+            </p:spPr>
+            <p:style>
+              <a:lnRef idx="2">
+                <a:schemeClr val="accent1">
+                  <a:shade val="50000"/>
+                </a:schemeClr>
+              </a:lnRef>
+              <a:fillRef idx="1">
+                <a:schemeClr val="accent1"/>
+              </a:fillRef>
+              <a:effectRef idx="0">
+                <a:schemeClr val="accent1"/>
+              </a:effectRef>
+              <a:fontRef idx="minor">
+                <a:schemeClr val="lt1"/>
+              </a:fontRef>
+            </p:style>
+            <p:txBody>
+              <a:bodyPr rtlCol="0" anchor="ctr"/>
+              <a:lstStyle/>
+              <a:p>
+                <a:pPr algn="ctr"/>
+                <a:endParaRPr lang="en-US" dirty="0"/>
+              </a:p>
+              <a:p>
+                <a:pPr algn="ctr"/>
+                <a:endParaRPr lang="en-US" dirty="0"/>
+              </a:p>
+              <a:p>
+                <a:pPr algn="ctr"/>
+                <a:endParaRPr lang="en-US" dirty="0"/>
+              </a:p>
+              <a:p>
+                <a:pPr algn="ctr"/>
+                <a:endParaRPr lang="en-US" dirty="0"/>
+              </a:p>
+              <a:p>
+                <a:pPr algn="ctr"/>
+                <a:endParaRPr lang="en-US" dirty="0"/>
+              </a:p>
+            </p:txBody>
+          </p:sp>
+        </p:grpSp>
+      </p:grpSp>
+    </p:spTree>
+    <p:extLst>
+      <p:ext uri="{BB962C8B-B14F-4D97-AF65-F5344CB8AC3E}">
+        <p14:creationId xmlns:p14="http://schemas.microsoft.com/office/powerpoint/2010/main" val="1951753086"/>
       </p:ext>
     </p:extLst>
   </p:cSld>

</xml_diff>